<commit_message>
Modificaciones en el documento
</commit_message>
<xml_diff>
--- a/TP-2/Grupo07/Documento proyecto/Trabajo practco 2.pptx
+++ b/TP-2/Grupo07/Documento proyecto/Trabajo practco 2.pptx
@@ -3456,8 +3456,8 @@
         </p:nvSpPr>
         <p:spPr>
           <a:xfrm rot="0">
-            <a:off x="5311002" y="5258168"/>
-            <a:ext cx="7491186" cy="773201"/>
+            <a:off x="4253385" y="5258168"/>
+            <a:ext cx="9781229" cy="773201"/>
           </a:xfrm>
           <a:prstGeom prst="rect">
             <a:avLst/>
@@ -3484,7 +3484,7 @@
                 <a:cs typeface="TT Interphases"/>
                 <a:sym typeface="TT Interphases"/>
               </a:rPr>
-              <a:t>Tecnologia y gestion web</a:t>
+              <a:t>Tecnologia y gestion web - Grupo 07</a:t>
             </a:r>
           </a:p>
         </p:txBody>
@@ -5260,7 +5260,7 @@
         <p:spPr>
           <a:xfrm rot="0">
             <a:off x="12678720" y="1494189"/>
-            <a:ext cx="3644053" cy="972219"/>
+            <a:ext cx="3644053" cy="1305594"/>
           </a:xfrm>
           <a:prstGeom prst="rect">
             <a:avLst/>
@@ -5290,7 +5290,7 @@
                 <a:cs typeface="TT Interphases"/>
                 <a:sym typeface="TT Interphases"/>
               </a:rPr>
-              <a:t>El bosquejo del frontend, guiado por el  layout propuesto por la catedra fue realizado por todos los integrantes</a:t>
+              <a:t>El bosquejo y desarrollo del frontend, guiado por el  layout propuesto por la catedra fue realizado por todos los integrantes</a:t>
             </a:r>
           </a:p>
         </p:txBody>

</xml_diff>